<commit_message>
Update for the arrays presentation
</commit_message>
<xml_diff>
--- a/Lodash.pptx
+++ b/Lodash.pptx
@@ -16,6 +16,15 @@
     <p:sldId id="265" r:id="rId10"/>
     <p:sldId id="267" r:id="rId11"/>
     <p:sldId id="268" r:id="rId12"/>
+    <p:sldId id="269" r:id="rId13"/>
+    <p:sldId id="270" r:id="rId14"/>
+    <p:sldId id="272" r:id="rId15"/>
+    <p:sldId id="273" r:id="rId16"/>
+    <p:sldId id="274" r:id="rId17"/>
+    <p:sldId id="275" r:id="rId18"/>
+    <p:sldId id="276" r:id="rId19"/>
+    <p:sldId id="277" r:id="rId20"/>
+    <p:sldId id="278" r:id="rId21"/>
   </p:sldIdLst>
   <p:sldSz cx="12192000" cy="6858000"/>
   <p:notesSz cx="6858000" cy="9144000"/>
@@ -6218,6 +6227,95 @@
           </a:prstGeom>
         </p:spPr>
       </p:pic>
+      <p:sp>
+        <p:nvSpPr>
+          <p:cNvPr id="2" name="TextBox 1">
+            <a:extLst>
+              <a:ext uri="{FF2B5EF4-FFF2-40B4-BE49-F238E27FC236}">
+                <a16:creationId xmlns:a16="http://schemas.microsoft.com/office/drawing/2014/main" id="{D1094BD3-B06A-402A-98AB-16CF05CF2D22}"/>
+              </a:ext>
+            </a:extLst>
+          </p:cNvPr>
+          <p:cNvSpPr txBox="1"/>
+          <p:nvPr/>
+        </p:nvSpPr>
+        <p:spPr>
+          <a:xfrm>
+            <a:off x="8323730" y="5766755"/>
+            <a:ext cx="2128147" cy="646331"/>
+          </a:xfrm>
+          <a:prstGeom prst="rect">
+            <a:avLst/>
+          </a:prstGeom>
+          <a:noFill/>
+        </p:spPr>
+        <p:txBody>
+          <a:bodyPr wrap="none" rtlCol="0">
+            <a:spAutoFit/>
+          </a:bodyPr>
+          <a:lstStyle/>
+          <a:p>
+            <a:r>
+              <a:rPr lang="en-US" dirty="0"/>
+              <a:t>Presented by: </a:t>
+            </a:r>
+          </a:p>
+          <a:p>
+            <a:r>
+              <a:rPr lang="en-US" dirty="0"/>
+              <a:t>Kostadin Prosenikov</a:t>
+            </a:r>
+            <a:endParaRPr lang="bg-BG" dirty="0"/>
+          </a:p>
+        </p:txBody>
+      </p:sp>
+      <p:pic>
+        <p:nvPicPr>
+          <p:cNvPr id="11266" name="Picture 2" descr="Image result for blubito">
+            <a:extLst>
+              <a:ext uri="{FF2B5EF4-FFF2-40B4-BE49-F238E27FC236}">
+                <a16:creationId xmlns:a16="http://schemas.microsoft.com/office/drawing/2014/main" id="{50B46680-7B4E-4BED-8769-667BE87690B1}"/>
+              </a:ext>
+            </a:extLst>
+          </p:cNvPr>
+          <p:cNvPicPr>
+            <a:picLocks noChangeAspect="1" noChangeArrowheads="1"/>
+          </p:cNvPicPr>
+          <p:nvPr/>
+        </p:nvPicPr>
+        <p:blipFill>
+          <a:blip r:embed="rId4">
+            <a:extLst>
+              <a:ext uri="{28A0092B-C50C-407E-A947-70E740481C1C}">
+                <a14:useLocalDpi xmlns:a14="http://schemas.microsoft.com/office/drawing/2010/main" val="0"/>
+              </a:ext>
+            </a:extLst>
+          </a:blip>
+          <a:srcRect/>
+          <a:stretch>
+            <a:fillRect/>
+          </a:stretch>
+        </p:blipFill>
+        <p:spPr bwMode="auto">
+          <a:xfrm>
+            <a:off x="10866269" y="5666344"/>
+            <a:ext cx="746742" cy="746742"/>
+          </a:xfrm>
+          <a:prstGeom prst="rect">
+            <a:avLst/>
+          </a:prstGeom>
+          <a:noFill/>
+          <a:extLst>
+            <a:ext uri="{909E8E84-426E-40DD-AFC4-6F175D3DCCD1}">
+              <a14:hiddenFill xmlns:a14="http://schemas.microsoft.com/office/drawing/2010/main">
+                <a:solidFill>
+                  <a:srgbClr val="FFFFFF"/>
+                </a:solidFill>
+              </a14:hiddenFill>
+            </a:ext>
+          </a:extLst>
+        </p:spPr>
+      </p:pic>
     </p:spTree>
     <p:extLst>
       <p:ext uri="{BB962C8B-B14F-4D97-AF65-F5344CB8AC3E}">
@@ -6275,7 +6373,9 @@
           <a:lstStyle/>
           <a:p>
             <a:r>
-              <a:rPr lang="en-US" dirty="0"/>
+              <a:rPr lang="en-US" dirty="0">
+                <a:latin typeface="Arial Rounded MT Bold" panose="020F0704030504030204" pitchFamily="34" charset="0"/>
+              </a:rPr>
               <a:t>toPairs and fromPairs</a:t>
             </a:r>
             <a:endParaRPr lang="bg-BG" dirty="0"/>
@@ -6448,7 +6548,9 @@
           <a:lstStyle/>
           <a:p>
             <a:r>
-              <a:rPr lang="en-US" dirty="0"/>
+              <a:rPr lang="en-US" dirty="0">
+                <a:latin typeface="Arial Rounded MT Bold" panose="020F0704030504030204" pitchFamily="34" charset="0"/>
+              </a:rPr>
               <a:t>Head and last</a:t>
             </a:r>
             <a:endParaRPr lang="bg-BG" dirty="0"/>
@@ -6549,6 +6651,1242 @@
     <p:extLst>
       <p:ext uri="{BB962C8B-B14F-4D97-AF65-F5344CB8AC3E}">
         <p14:creationId xmlns:p14="http://schemas.microsoft.com/office/powerpoint/2010/main" val="1382499008"/>
+      </p:ext>
+    </p:extLst>
+  </p:cSld>
+  <p:clrMapOvr>
+    <a:masterClrMapping/>
+  </p:clrMapOvr>
+</p:sld>
+</file>
+
+<file path=ppt/slides/slide12.xml><?xml version="1.0" encoding="utf-8"?>
+<p:sld xmlns:a="http://schemas.openxmlformats.org/drawingml/2006/main" xmlns:r="http://schemas.openxmlformats.org/officeDocument/2006/relationships" xmlns:p="http://schemas.openxmlformats.org/presentationml/2006/main">
+  <p:cSld>
+    <p:spTree>
+      <p:nvGrpSpPr>
+        <p:cNvPr id="1" name=""/>
+        <p:cNvGrpSpPr/>
+        <p:nvPr/>
+      </p:nvGrpSpPr>
+      <p:grpSpPr>
+        <a:xfrm>
+          <a:off x="0" y="0"/>
+          <a:ext cx="0" cy="0"/>
+          <a:chOff x="0" y="0"/>
+          <a:chExt cx="0" cy="0"/>
+        </a:xfrm>
+      </p:grpSpPr>
+      <p:sp>
+        <p:nvSpPr>
+          <p:cNvPr id="2" name="Title 1">
+            <a:extLst>
+              <a:ext uri="{FF2B5EF4-FFF2-40B4-BE49-F238E27FC236}">
+                <a16:creationId xmlns:a16="http://schemas.microsoft.com/office/drawing/2014/main" id="{5A427D0A-D6FB-477A-97A7-351BB69A5B48}"/>
+              </a:ext>
+            </a:extLst>
+          </p:cNvPr>
+          <p:cNvSpPr>
+            <a:spLocks noGrp="1"/>
+          </p:cNvSpPr>
+          <p:nvPr>
+            <p:ph type="title"/>
+          </p:nvPr>
+        </p:nvSpPr>
+        <p:spPr>
+          <a:xfrm>
+            <a:off x="1484310" y="255954"/>
+            <a:ext cx="10018713" cy="853831"/>
+          </a:xfrm>
+        </p:spPr>
+        <p:txBody>
+          <a:bodyPr/>
+          <a:lstStyle/>
+          <a:p>
+            <a:r>
+              <a:rPr lang="en-US" dirty="0">
+                <a:latin typeface="Arial Rounded MT Bold" panose="020F0704030504030204" pitchFamily="34" charset="0"/>
+              </a:rPr>
+              <a:t>Intersection of 2 arrays</a:t>
+            </a:r>
+            <a:endParaRPr lang="bg-BG" dirty="0"/>
+          </a:p>
+        </p:txBody>
+      </p:sp>
+      <p:sp>
+        <p:nvSpPr>
+          <p:cNvPr id="3" name="Content Placeholder 2">
+            <a:extLst>
+              <a:ext uri="{FF2B5EF4-FFF2-40B4-BE49-F238E27FC236}">
+                <a16:creationId xmlns:a16="http://schemas.microsoft.com/office/drawing/2014/main" id="{A93A0F54-9DB8-4503-AC4D-560E2F1F25C1}"/>
+              </a:ext>
+            </a:extLst>
+          </p:cNvPr>
+          <p:cNvSpPr>
+            <a:spLocks noGrp="1"/>
+          </p:cNvSpPr>
+          <p:nvPr>
+            <p:ph idx="1"/>
+          </p:nvPr>
+        </p:nvSpPr>
+        <p:spPr>
+          <a:xfrm>
+            <a:off x="1821660" y="1056595"/>
+            <a:ext cx="10018713" cy="5351584"/>
+          </a:xfrm>
+        </p:spPr>
+        <p:txBody>
+          <a:bodyPr anchor="t" anchorCtr="0">
+            <a:noAutofit/>
+          </a:bodyPr>
+          <a:lstStyle/>
+          <a:p>
+            <a:r>
+              <a:rPr lang="en-US" dirty="0">
+                <a:latin typeface="Arial Rounded MT Bold" panose="020F0704030504030204" pitchFamily="34" charset="0"/>
+              </a:rPr>
+              <a:t>Intersection – Creates an array of unique values, which are included in both searched arrays</a:t>
+            </a:r>
+          </a:p>
+          <a:p>
+            <a:r>
+              <a:rPr lang="en-US" dirty="0">
+                <a:latin typeface="Arial Rounded MT Bold" panose="020F0704030504030204" pitchFamily="34" charset="0"/>
+              </a:rPr>
+              <a:t>_.intersection([2, 1], [2, 3]);</a:t>
+            </a:r>
+          </a:p>
+          <a:p>
+            <a:r>
+              <a:rPr lang="en-US" dirty="0">
+                <a:latin typeface="Arial Rounded MT Bold" panose="020F0704030504030204" pitchFamily="34" charset="0"/>
+              </a:rPr>
+              <a:t>// =&gt; [2]</a:t>
+            </a:r>
+          </a:p>
+          <a:p>
+            <a:pPr marL="0" indent="0">
+              <a:buNone/>
+            </a:pPr>
+            <a:endParaRPr lang="en-US" dirty="0">
+              <a:latin typeface="Arial Rounded MT Bold" panose="020F0704030504030204" pitchFamily="34" charset="0"/>
+            </a:endParaRPr>
+          </a:p>
+          <a:p>
+            <a:r>
+              <a:rPr lang="en-US" dirty="0">
+                <a:latin typeface="Arial Rounded MT Bold" panose="020F0704030504030204" pitchFamily="34" charset="0"/>
+              </a:rPr>
+              <a:t>IntersectionBy – used for array of objects (collection). Third argument is the property to look for interception.</a:t>
+            </a:r>
+          </a:p>
+          <a:p>
+            <a:r>
+              <a:rPr lang="en-US" dirty="0">
+                <a:latin typeface="Arial Rounded MT Bold" panose="020F0704030504030204" pitchFamily="34" charset="0"/>
+              </a:rPr>
+              <a:t>// The `_.property` iteratee shorthand.</a:t>
+            </a:r>
+          </a:p>
+          <a:p>
+            <a:r>
+              <a:rPr lang="en-US" dirty="0">
+                <a:latin typeface="Arial Rounded MT Bold" panose="020F0704030504030204" pitchFamily="34" charset="0"/>
+              </a:rPr>
+              <a:t>_.intersectionBy([{ 'x': 1 }], [{ 'x': 2 }, { 'x': 1 }], 'x');</a:t>
+            </a:r>
+          </a:p>
+          <a:p>
+            <a:r>
+              <a:rPr lang="en-US" dirty="0">
+                <a:latin typeface="Arial Rounded MT Bold" panose="020F0704030504030204" pitchFamily="34" charset="0"/>
+              </a:rPr>
+              <a:t>// =&gt; [{ 'x': 1 }]</a:t>
+            </a:r>
+          </a:p>
+        </p:txBody>
+      </p:sp>
+    </p:spTree>
+    <p:extLst>
+      <p:ext uri="{BB962C8B-B14F-4D97-AF65-F5344CB8AC3E}">
+        <p14:creationId xmlns:p14="http://schemas.microsoft.com/office/powerpoint/2010/main" val="683052035"/>
+      </p:ext>
+    </p:extLst>
+  </p:cSld>
+  <p:clrMapOvr>
+    <a:masterClrMapping/>
+  </p:clrMapOvr>
+</p:sld>
+</file>
+
+<file path=ppt/slides/slide13.xml><?xml version="1.0" encoding="utf-8"?>
+<p:sld xmlns:a="http://schemas.openxmlformats.org/drawingml/2006/main" xmlns:r="http://schemas.openxmlformats.org/officeDocument/2006/relationships" xmlns:p="http://schemas.openxmlformats.org/presentationml/2006/main">
+  <p:cSld>
+    <p:spTree>
+      <p:nvGrpSpPr>
+        <p:cNvPr id="1" name=""/>
+        <p:cNvGrpSpPr/>
+        <p:nvPr/>
+      </p:nvGrpSpPr>
+      <p:grpSpPr>
+        <a:xfrm>
+          <a:off x="0" y="0"/>
+          <a:ext cx="0" cy="0"/>
+          <a:chOff x="0" y="0"/>
+          <a:chExt cx="0" cy="0"/>
+        </a:xfrm>
+      </p:grpSpPr>
+      <p:sp>
+        <p:nvSpPr>
+          <p:cNvPr id="2" name="Title 1">
+            <a:extLst>
+              <a:ext uri="{FF2B5EF4-FFF2-40B4-BE49-F238E27FC236}">
+                <a16:creationId xmlns:a16="http://schemas.microsoft.com/office/drawing/2014/main" id="{5A427D0A-D6FB-477A-97A7-351BB69A5B48}"/>
+              </a:ext>
+            </a:extLst>
+          </p:cNvPr>
+          <p:cNvSpPr>
+            <a:spLocks noGrp="1"/>
+          </p:cNvSpPr>
+          <p:nvPr>
+            <p:ph type="title"/>
+          </p:nvPr>
+        </p:nvSpPr>
+        <p:spPr>
+          <a:xfrm>
+            <a:off x="1484310" y="255954"/>
+            <a:ext cx="10018713" cy="853831"/>
+          </a:xfrm>
+        </p:spPr>
+        <p:txBody>
+          <a:bodyPr/>
+          <a:lstStyle/>
+          <a:p>
+            <a:r>
+              <a:rPr lang="en-US" dirty="0">
+                <a:latin typeface="Arial Rounded MT Bold" panose="020F0704030504030204" pitchFamily="34" charset="0"/>
+              </a:rPr>
+              <a:t>Join</a:t>
+            </a:r>
+            <a:endParaRPr lang="bg-BG" dirty="0"/>
+          </a:p>
+        </p:txBody>
+      </p:sp>
+      <p:sp>
+        <p:nvSpPr>
+          <p:cNvPr id="3" name="Content Placeholder 2">
+            <a:extLst>
+              <a:ext uri="{FF2B5EF4-FFF2-40B4-BE49-F238E27FC236}">
+                <a16:creationId xmlns:a16="http://schemas.microsoft.com/office/drawing/2014/main" id="{A93A0F54-9DB8-4503-AC4D-560E2F1F25C1}"/>
+              </a:ext>
+            </a:extLst>
+          </p:cNvPr>
+          <p:cNvSpPr>
+            <a:spLocks noGrp="1"/>
+          </p:cNvSpPr>
+          <p:nvPr>
+            <p:ph idx="1"/>
+          </p:nvPr>
+        </p:nvSpPr>
+        <p:spPr>
+          <a:xfrm>
+            <a:off x="1821660" y="1056595"/>
+            <a:ext cx="10018713" cy="5351584"/>
+          </a:xfrm>
+        </p:spPr>
+        <p:txBody>
+          <a:bodyPr anchor="t" anchorCtr="0">
+            <a:noAutofit/>
+          </a:bodyPr>
+          <a:lstStyle/>
+          <a:p>
+            <a:r>
+              <a:rPr lang="en-US" dirty="0">
+                <a:latin typeface="Arial Rounded MT Bold" panose="020F0704030504030204" pitchFamily="34" charset="0"/>
+              </a:rPr>
+              <a:t>Join – convert all array elements into a string (useful for debugging)</a:t>
+            </a:r>
+          </a:p>
+          <a:p>
+            <a:endParaRPr lang="en-US" dirty="0">
+              <a:latin typeface="Arial Rounded MT Bold" panose="020F0704030504030204" pitchFamily="34" charset="0"/>
+            </a:endParaRPr>
+          </a:p>
+          <a:p>
+            <a:r>
+              <a:rPr lang="en-US" dirty="0">
+                <a:latin typeface="Arial Rounded MT Bold" panose="020F0704030504030204" pitchFamily="34" charset="0"/>
+              </a:rPr>
+              <a:t>_.join(['iPhone', 'S 10', 'Galaxy Fold'], ', ');</a:t>
+            </a:r>
+          </a:p>
+          <a:p>
+            <a:r>
+              <a:rPr lang="en-US" dirty="0">
+                <a:latin typeface="Arial Rounded MT Bold" panose="020F0704030504030204" pitchFamily="34" charset="0"/>
+              </a:rPr>
+              <a:t>// =&gt; 'iPhone, S 10, Galaxy Fold'</a:t>
+            </a:r>
+          </a:p>
+          <a:p>
+            <a:endParaRPr lang="en-US" dirty="0">
+              <a:latin typeface="Arial Rounded MT Bold" panose="020F0704030504030204" pitchFamily="34" charset="0"/>
+            </a:endParaRPr>
+          </a:p>
+          <a:p>
+            <a:endParaRPr lang="en-US" dirty="0">
+              <a:latin typeface="Arial Rounded MT Bold" panose="020F0704030504030204" pitchFamily="34" charset="0"/>
+            </a:endParaRPr>
+          </a:p>
+        </p:txBody>
+      </p:sp>
+    </p:spTree>
+    <p:extLst>
+      <p:ext uri="{BB962C8B-B14F-4D97-AF65-F5344CB8AC3E}">
+        <p14:creationId xmlns:p14="http://schemas.microsoft.com/office/powerpoint/2010/main" val="3685630265"/>
+      </p:ext>
+    </p:extLst>
+  </p:cSld>
+  <p:clrMapOvr>
+    <a:masterClrMapping/>
+  </p:clrMapOvr>
+</p:sld>
+</file>
+
+<file path=ppt/slides/slide14.xml><?xml version="1.0" encoding="utf-8"?>
+<p:sld xmlns:a="http://schemas.openxmlformats.org/drawingml/2006/main" xmlns:r="http://schemas.openxmlformats.org/officeDocument/2006/relationships" xmlns:p="http://schemas.openxmlformats.org/presentationml/2006/main">
+  <p:cSld>
+    <p:spTree>
+      <p:nvGrpSpPr>
+        <p:cNvPr id="1" name=""/>
+        <p:cNvGrpSpPr/>
+        <p:nvPr/>
+      </p:nvGrpSpPr>
+      <p:grpSpPr>
+        <a:xfrm>
+          <a:off x="0" y="0"/>
+          <a:ext cx="0" cy="0"/>
+          <a:chOff x="0" y="0"/>
+          <a:chExt cx="0" cy="0"/>
+        </a:xfrm>
+      </p:grpSpPr>
+      <p:sp>
+        <p:nvSpPr>
+          <p:cNvPr id="2" name="Title 1">
+            <a:extLst>
+              <a:ext uri="{FF2B5EF4-FFF2-40B4-BE49-F238E27FC236}">
+                <a16:creationId xmlns:a16="http://schemas.microsoft.com/office/drawing/2014/main" id="{5A427D0A-D6FB-477A-97A7-351BB69A5B48}"/>
+              </a:ext>
+            </a:extLst>
+          </p:cNvPr>
+          <p:cNvSpPr>
+            <a:spLocks noGrp="1"/>
+          </p:cNvSpPr>
+          <p:nvPr>
+            <p:ph type="title"/>
+          </p:nvPr>
+        </p:nvSpPr>
+        <p:spPr>
+          <a:xfrm>
+            <a:off x="1484310" y="255954"/>
+            <a:ext cx="10018713" cy="853831"/>
+          </a:xfrm>
+        </p:spPr>
+        <p:txBody>
+          <a:bodyPr/>
+          <a:lstStyle/>
+          <a:p>
+            <a:r>
+              <a:rPr lang="en-US" dirty="0">
+                <a:latin typeface="Arial Rounded MT Bold" panose="020F0704030504030204" pitchFamily="34" charset="0"/>
+              </a:rPr>
+              <a:t>Pull And Pull All</a:t>
+            </a:r>
+            <a:endParaRPr lang="bg-BG" dirty="0"/>
+          </a:p>
+        </p:txBody>
+      </p:sp>
+      <p:sp>
+        <p:nvSpPr>
+          <p:cNvPr id="3" name="Content Placeholder 2">
+            <a:extLst>
+              <a:ext uri="{FF2B5EF4-FFF2-40B4-BE49-F238E27FC236}">
+                <a16:creationId xmlns:a16="http://schemas.microsoft.com/office/drawing/2014/main" id="{A93A0F54-9DB8-4503-AC4D-560E2F1F25C1}"/>
+              </a:ext>
+            </a:extLst>
+          </p:cNvPr>
+          <p:cNvSpPr>
+            <a:spLocks noGrp="1"/>
+          </p:cNvSpPr>
+          <p:nvPr>
+            <p:ph idx="1"/>
+          </p:nvPr>
+        </p:nvSpPr>
+        <p:spPr>
+          <a:xfrm>
+            <a:off x="1821660" y="1056595"/>
+            <a:ext cx="10018713" cy="5351584"/>
+          </a:xfrm>
+        </p:spPr>
+        <p:txBody>
+          <a:bodyPr anchor="t" anchorCtr="0">
+            <a:noAutofit/>
+          </a:bodyPr>
+          <a:lstStyle/>
+          <a:p>
+            <a:r>
+              <a:rPr lang="en-US" dirty="0">
+                <a:latin typeface="Arial Rounded MT Bold" panose="020F0704030504030204" pitchFamily="34" charset="0"/>
+              </a:rPr>
+              <a:t>Pull – removes values given from an array</a:t>
+            </a:r>
+          </a:p>
+          <a:p>
+            <a:r>
+              <a:rPr lang="en-US" dirty="0">
+                <a:latin typeface="Arial Rounded MT Bold" panose="020F0704030504030204" pitchFamily="34" charset="0"/>
+              </a:rPr>
+              <a:t>const array = ['a', 'b', 'c', 'a', 'b', 'c'];</a:t>
+            </a:r>
+          </a:p>
+          <a:p>
+            <a:r>
+              <a:rPr lang="en-US" dirty="0">
+                <a:latin typeface="Arial Rounded MT Bold" panose="020F0704030504030204" pitchFamily="34" charset="0"/>
+              </a:rPr>
+              <a:t>_.pull(array, 'a', 'c');</a:t>
+            </a:r>
+          </a:p>
+          <a:p>
+            <a:r>
+              <a:rPr lang="en-US" dirty="0">
+                <a:latin typeface="Arial Rounded MT Bold" panose="020F0704030504030204" pitchFamily="34" charset="0"/>
+              </a:rPr>
+              <a:t>// =&gt; ['b', ‘b’]</a:t>
+            </a:r>
+          </a:p>
+          <a:p>
+            <a:endParaRPr lang="en-US" dirty="0">
+              <a:latin typeface="Arial Rounded MT Bold" panose="020F0704030504030204" pitchFamily="34" charset="0"/>
+            </a:endParaRPr>
+          </a:p>
+          <a:p>
+            <a:r>
+              <a:rPr lang="en-US" dirty="0">
+                <a:latin typeface="Arial Rounded MT Bold" panose="020F0704030504030204" pitchFamily="34" charset="0"/>
+              </a:rPr>
+              <a:t>PullAll – same as pull, but it accepts an array of values</a:t>
+            </a:r>
+          </a:p>
+          <a:p>
+            <a:r>
+              <a:rPr lang="en-US" dirty="0">
+                <a:latin typeface="Arial Rounded MT Bold" panose="020F0704030504030204" pitchFamily="34" charset="0"/>
+              </a:rPr>
+              <a:t>const array = ['a', 'b', 'c', 'a', 'b', 'c'];</a:t>
+            </a:r>
+          </a:p>
+          <a:p>
+            <a:r>
+              <a:rPr lang="en-US" dirty="0">
+                <a:latin typeface="Arial Rounded MT Bold" panose="020F0704030504030204" pitchFamily="34" charset="0"/>
+              </a:rPr>
+              <a:t>_.pullAll(array, ['a', 'c']);</a:t>
+            </a:r>
+          </a:p>
+          <a:p>
+            <a:r>
+              <a:rPr lang="en-US" dirty="0">
+                <a:latin typeface="Arial Rounded MT Bold" panose="020F0704030504030204" pitchFamily="34" charset="0"/>
+              </a:rPr>
+              <a:t>// =&gt; ['b', 'b']</a:t>
+            </a:r>
+          </a:p>
+          <a:p>
+            <a:endParaRPr lang="en-US" dirty="0">
+              <a:latin typeface="Arial Rounded MT Bold" panose="020F0704030504030204" pitchFamily="34" charset="0"/>
+            </a:endParaRPr>
+          </a:p>
+        </p:txBody>
+      </p:sp>
+    </p:spTree>
+    <p:extLst>
+      <p:ext uri="{BB962C8B-B14F-4D97-AF65-F5344CB8AC3E}">
+        <p14:creationId xmlns:p14="http://schemas.microsoft.com/office/powerpoint/2010/main" val="1666033953"/>
+      </p:ext>
+    </p:extLst>
+  </p:cSld>
+  <p:clrMapOvr>
+    <a:masterClrMapping/>
+  </p:clrMapOvr>
+</p:sld>
+</file>
+
+<file path=ppt/slides/slide15.xml><?xml version="1.0" encoding="utf-8"?>
+<p:sld xmlns:a="http://schemas.openxmlformats.org/drawingml/2006/main" xmlns:r="http://schemas.openxmlformats.org/officeDocument/2006/relationships" xmlns:p="http://schemas.openxmlformats.org/presentationml/2006/main">
+  <p:cSld>
+    <p:spTree>
+      <p:nvGrpSpPr>
+        <p:cNvPr id="1" name=""/>
+        <p:cNvGrpSpPr/>
+        <p:nvPr/>
+      </p:nvGrpSpPr>
+      <p:grpSpPr>
+        <a:xfrm>
+          <a:off x="0" y="0"/>
+          <a:ext cx="0" cy="0"/>
+          <a:chOff x="0" y="0"/>
+          <a:chExt cx="0" cy="0"/>
+        </a:xfrm>
+      </p:grpSpPr>
+      <p:sp>
+        <p:nvSpPr>
+          <p:cNvPr id="2" name="Title 1">
+            <a:extLst>
+              <a:ext uri="{FF2B5EF4-FFF2-40B4-BE49-F238E27FC236}">
+                <a16:creationId xmlns:a16="http://schemas.microsoft.com/office/drawing/2014/main" id="{5A427D0A-D6FB-477A-97A7-351BB69A5B48}"/>
+              </a:ext>
+            </a:extLst>
+          </p:cNvPr>
+          <p:cNvSpPr>
+            <a:spLocks noGrp="1"/>
+          </p:cNvSpPr>
+          <p:nvPr>
+            <p:ph type="title"/>
+          </p:nvPr>
+        </p:nvSpPr>
+        <p:spPr>
+          <a:xfrm>
+            <a:off x="1484310" y="255954"/>
+            <a:ext cx="10018713" cy="853831"/>
+          </a:xfrm>
+        </p:spPr>
+        <p:txBody>
+          <a:bodyPr/>
+          <a:lstStyle/>
+          <a:p>
+            <a:r>
+              <a:rPr lang="en-US" dirty="0">
+                <a:latin typeface="Arial Rounded MT Bold" panose="020F0704030504030204" pitchFamily="34" charset="0"/>
+              </a:rPr>
+              <a:t>Remove</a:t>
+            </a:r>
+            <a:endParaRPr lang="bg-BG" dirty="0"/>
+          </a:p>
+        </p:txBody>
+      </p:sp>
+      <p:sp>
+        <p:nvSpPr>
+          <p:cNvPr id="3" name="Content Placeholder 2">
+            <a:extLst>
+              <a:ext uri="{FF2B5EF4-FFF2-40B4-BE49-F238E27FC236}">
+                <a16:creationId xmlns:a16="http://schemas.microsoft.com/office/drawing/2014/main" id="{A93A0F54-9DB8-4503-AC4D-560E2F1F25C1}"/>
+              </a:ext>
+            </a:extLst>
+          </p:cNvPr>
+          <p:cNvSpPr>
+            <a:spLocks noGrp="1"/>
+          </p:cNvSpPr>
+          <p:nvPr>
+            <p:ph idx="1"/>
+          </p:nvPr>
+        </p:nvSpPr>
+        <p:spPr>
+          <a:xfrm>
+            <a:off x="1821660" y="1056595"/>
+            <a:ext cx="10018713" cy="5351584"/>
+          </a:xfrm>
+        </p:spPr>
+        <p:txBody>
+          <a:bodyPr anchor="t" anchorCtr="0">
+            <a:noAutofit/>
+          </a:bodyPr>
+          <a:lstStyle/>
+          <a:p>
+            <a:r>
+              <a:rPr lang="en-US" dirty="0">
+                <a:latin typeface="Arial Rounded MT Bold" panose="020F0704030504030204" pitchFamily="34" charset="0"/>
+              </a:rPr>
+              <a:t>Remove – removes all elements from an array, for which the function returns true.</a:t>
+            </a:r>
+          </a:p>
+          <a:p>
+            <a:r>
+              <a:rPr lang="en-US" dirty="0">
+                <a:latin typeface="Arial Rounded MT Bold" panose="020F0704030504030204" pitchFamily="34" charset="0"/>
+              </a:rPr>
+              <a:t>const array = [1, 2, 3, 4];</a:t>
+            </a:r>
+          </a:p>
+          <a:p>
+            <a:r>
+              <a:rPr lang="en-US" dirty="0">
+                <a:latin typeface="Arial Rounded MT Bold" panose="020F0704030504030204" pitchFamily="34" charset="0"/>
+              </a:rPr>
+              <a:t>const evens = _.remove(array, function(n) {</a:t>
+            </a:r>
+          </a:p>
+          <a:p>
+            <a:r>
+              <a:rPr lang="en-US" dirty="0">
+                <a:latin typeface="Arial Rounded MT Bold" panose="020F0704030504030204" pitchFamily="34" charset="0"/>
+              </a:rPr>
+              <a:t>  return n % 2 == 0;</a:t>
+            </a:r>
+          </a:p>
+          <a:p>
+            <a:r>
+              <a:rPr lang="en-US" dirty="0">
+                <a:latin typeface="Arial Rounded MT Bold" panose="020F0704030504030204" pitchFamily="34" charset="0"/>
+              </a:rPr>
+              <a:t>});</a:t>
+            </a:r>
+          </a:p>
+          <a:p>
+            <a:endParaRPr lang="en-US" dirty="0">
+              <a:latin typeface="Arial Rounded MT Bold" panose="020F0704030504030204" pitchFamily="34" charset="0"/>
+            </a:endParaRPr>
+          </a:p>
+          <a:p>
+            <a:r>
+              <a:rPr lang="en-US" dirty="0">
+                <a:latin typeface="Arial Rounded MT Bold" panose="020F0704030504030204" pitchFamily="34" charset="0"/>
+              </a:rPr>
+              <a:t> // array = [1, 3]</a:t>
+            </a:r>
+          </a:p>
+          <a:p>
+            <a:r>
+              <a:rPr lang="en-US" dirty="0">
+                <a:latin typeface="Arial Rounded MT Bold" panose="020F0704030504030204" pitchFamily="34" charset="0"/>
+              </a:rPr>
+              <a:t>// evens =&gt; [2, 4]</a:t>
+            </a:r>
+          </a:p>
+        </p:txBody>
+      </p:sp>
+    </p:spTree>
+    <p:extLst>
+      <p:ext uri="{BB962C8B-B14F-4D97-AF65-F5344CB8AC3E}">
+        <p14:creationId xmlns:p14="http://schemas.microsoft.com/office/powerpoint/2010/main" val="2365336789"/>
+      </p:ext>
+    </p:extLst>
+  </p:cSld>
+  <p:clrMapOvr>
+    <a:masterClrMapping/>
+  </p:clrMapOvr>
+</p:sld>
+</file>
+
+<file path=ppt/slides/slide16.xml><?xml version="1.0" encoding="utf-8"?>
+<p:sld xmlns:a="http://schemas.openxmlformats.org/drawingml/2006/main" xmlns:r="http://schemas.openxmlformats.org/officeDocument/2006/relationships" xmlns:p="http://schemas.openxmlformats.org/presentationml/2006/main">
+  <p:cSld>
+    <p:spTree>
+      <p:nvGrpSpPr>
+        <p:cNvPr id="1" name=""/>
+        <p:cNvGrpSpPr/>
+        <p:nvPr/>
+      </p:nvGrpSpPr>
+      <p:grpSpPr>
+        <a:xfrm>
+          <a:off x="0" y="0"/>
+          <a:ext cx="0" cy="0"/>
+          <a:chOff x="0" y="0"/>
+          <a:chExt cx="0" cy="0"/>
+        </a:xfrm>
+      </p:grpSpPr>
+      <p:sp>
+        <p:nvSpPr>
+          <p:cNvPr id="2" name="Title 1">
+            <a:extLst>
+              <a:ext uri="{FF2B5EF4-FFF2-40B4-BE49-F238E27FC236}">
+                <a16:creationId xmlns:a16="http://schemas.microsoft.com/office/drawing/2014/main" id="{5A427D0A-D6FB-477A-97A7-351BB69A5B48}"/>
+              </a:ext>
+            </a:extLst>
+          </p:cNvPr>
+          <p:cNvSpPr>
+            <a:spLocks noGrp="1"/>
+          </p:cNvSpPr>
+          <p:nvPr>
+            <p:ph type="title"/>
+          </p:nvPr>
+        </p:nvSpPr>
+        <p:spPr>
+          <a:xfrm>
+            <a:off x="1484310" y="255954"/>
+            <a:ext cx="10018713" cy="853831"/>
+          </a:xfrm>
+        </p:spPr>
+        <p:txBody>
+          <a:bodyPr/>
+          <a:lstStyle/>
+          <a:p>
+            <a:r>
+              <a:rPr lang="en-US" dirty="0">
+                <a:latin typeface="Arial Rounded MT Bold" panose="020F0704030504030204" pitchFamily="34" charset="0"/>
+              </a:rPr>
+              <a:t>Reverse and Slice</a:t>
+            </a:r>
+            <a:endParaRPr lang="bg-BG" dirty="0"/>
+          </a:p>
+        </p:txBody>
+      </p:sp>
+      <p:sp>
+        <p:nvSpPr>
+          <p:cNvPr id="3" name="Content Placeholder 2">
+            <a:extLst>
+              <a:ext uri="{FF2B5EF4-FFF2-40B4-BE49-F238E27FC236}">
+                <a16:creationId xmlns:a16="http://schemas.microsoft.com/office/drawing/2014/main" id="{A93A0F54-9DB8-4503-AC4D-560E2F1F25C1}"/>
+              </a:ext>
+            </a:extLst>
+          </p:cNvPr>
+          <p:cNvSpPr>
+            <a:spLocks noGrp="1"/>
+          </p:cNvSpPr>
+          <p:nvPr>
+            <p:ph idx="1"/>
+          </p:nvPr>
+        </p:nvSpPr>
+        <p:spPr>
+          <a:xfrm>
+            <a:off x="1821660" y="1056595"/>
+            <a:ext cx="10018713" cy="5351584"/>
+          </a:xfrm>
+        </p:spPr>
+        <p:txBody>
+          <a:bodyPr anchor="t" anchorCtr="0">
+            <a:noAutofit/>
+          </a:bodyPr>
+          <a:lstStyle/>
+          <a:p>
+            <a:r>
+              <a:rPr lang="en-US" dirty="0">
+                <a:latin typeface="Arial Rounded MT Bold" panose="020F0704030504030204" pitchFamily="34" charset="0"/>
+              </a:rPr>
+              <a:t>Reverse – reverse all elements from an array</a:t>
+            </a:r>
+          </a:p>
+          <a:p>
+            <a:r>
+              <a:rPr lang="en-US" dirty="0">
+                <a:latin typeface="Arial Rounded MT Bold" panose="020F0704030504030204" pitchFamily="34" charset="0"/>
+              </a:rPr>
+              <a:t>const array = [1, 2, 3];</a:t>
+            </a:r>
+          </a:p>
+          <a:p>
+            <a:r>
+              <a:rPr lang="en-US" dirty="0">
+                <a:latin typeface="Arial Rounded MT Bold" panose="020F0704030504030204" pitchFamily="34" charset="0"/>
+              </a:rPr>
+              <a:t>_.reverse(array);</a:t>
+            </a:r>
+          </a:p>
+          <a:p>
+            <a:r>
+              <a:rPr lang="en-US" dirty="0">
+                <a:latin typeface="Arial Rounded MT Bold" panose="020F0704030504030204" pitchFamily="34" charset="0"/>
+              </a:rPr>
+              <a:t>// =&gt; [3, 2, 1]</a:t>
+            </a:r>
+          </a:p>
+          <a:p>
+            <a:endParaRPr lang="en-US" dirty="0">
+              <a:latin typeface="Arial Rounded MT Bold" panose="020F0704030504030204" pitchFamily="34" charset="0"/>
+            </a:endParaRPr>
+          </a:p>
+          <a:p>
+            <a:r>
+              <a:rPr lang="en-US" dirty="0">
+                <a:latin typeface="Arial Rounded MT Bold" panose="020F0704030504030204" pitchFamily="34" charset="0"/>
+              </a:rPr>
+              <a:t>Slice – Creates a slice of an array. Arguments – 1 (array to slice), 2 (start index), 3 – (end index)</a:t>
+            </a:r>
+          </a:p>
+          <a:p>
+            <a:r>
+              <a:rPr lang="en-US" dirty="0">
+                <a:latin typeface="Arial Rounded MT Bold" panose="020F0704030504030204" pitchFamily="34" charset="0"/>
+              </a:rPr>
+              <a:t>const animals = ['ant', 'bison', 'camel', 'duck', 'elephant'];</a:t>
+            </a:r>
+          </a:p>
+          <a:p>
+            <a:r>
+              <a:rPr lang="en-US" dirty="0">
+                <a:latin typeface="Arial Rounded MT Bold" panose="020F0704030504030204" pitchFamily="34" charset="0"/>
+              </a:rPr>
+              <a:t>_.slice(animals, 2);</a:t>
+            </a:r>
+          </a:p>
+          <a:p>
+            <a:r>
+              <a:rPr lang="en-US" dirty="0">
+                <a:latin typeface="Arial Rounded MT Bold" panose="020F0704030504030204" pitchFamily="34" charset="0"/>
+              </a:rPr>
+              <a:t>// =&gt; ["camel", "duck", "elephant"]</a:t>
+            </a:r>
+          </a:p>
+        </p:txBody>
+      </p:sp>
+    </p:spTree>
+    <p:extLst>
+      <p:ext uri="{BB962C8B-B14F-4D97-AF65-F5344CB8AC3E}">
+        <p14:creationId xmlns:p14="http://schemas.microsoft.com/office/powerpoint/2010/main" val="1202625712"/>
+      </p:ext>
+    </p:extLst>
+  </p:cSld>
+  <p:clrMapOvr>
+    <a:masterClrMapping/>
+  </p:clrMapOvr>
+</p:sld>
+</file>
+
+<file path=ppt/slides/slide17.xml><?xml version="1.0" encoding="utf-8"?>
+<p:sld xmlns:a="http://schemas.openxmlformats.org/drawingml/2006/main" xmlns:r="http://schemas.openxmlformats.org/officeDocument/2006/relationships" xmlns:p="http://schemas.openxmlformats.org/presentationml/2006/main">
+  <p:cSld>
+    <p:spTree>
+      <p:nvGrpSpPr>
+        <p:cNvPr id="1" name=""/>
+        <p:cNvGrpSpPr/>
+        <p:nvPr/>
+      </p:nvGrpSpPr>
+      <p:grpSpPr>
+        <a:xfrm>
+          <a:off x="0" y="0"/>
+          <a:ext cx="0" cy="0"/>
+          <a:chOff x="0" y="0"/>
+          <a:chExt cx="0" cy="0"/>
+        </a:xfrm>
+      </p:grpSpPr>
+      <p:sp>
+        <p:nvSpPr>
+          <p:cNvPr id="2" name="Title 1">
+            <a:extLst>
+              <a:ext uri="{FF2B5EF4-FFF2-40B4-BE49-F238E27FC236}">
+                <a16:creationId xmlns:a16="http://schemas.microsoft.com/office/drawing/2014/main" id="{5A427D0A-D6FB-477A-97A7-351BB69A5B48}"/>
+              </a:ext>
+            </a:extLst>
+          </p:cNvPr>
+          <p:cNvSpPr>
+            <a:spLocks noGrp="1"/>
+          </p:cNvSpPr>
+          <p:nvPr>
+            <p:ph type="title"/>
+          </p:nvPr>
+        </p:nvSpPr>
+        <p:spPr>
+          <a:xfrm>
+            <a:off x="1484310" y="255954"/>
+            <a:ext cx="10018713" cy="853831"/>
+          </a:xfrm>
+        </p:spPr>
+        <p:txBody>
+          <a:bodyPr/>
+          <a:lstStyle/>
+          <a:p>
+            <a:r>
+              <a:rPr lang="en-US" dirty="0">
+                <a:latin typeface="Arial Rounded MT Bold" panose="020F0704030504030204" pitchFamily="34" charset="0"/>
+              </a:rPr>
+              <a:t>Union and Unique</a:t>
+            </a:r>
+            <a:endParaRPr lang="bg-BG" dirty="0"/>
+          </a:p>
+        </p:txBody>
+      </p:sp>
+      <p:sp>
+        <p:nvSpPr>
+          <p:cNvPr id="3" name="Content Placeholder 2">
+            <a:extLst>
+              <a:ext uri="{FF2B5EF4-FFF2-40B4-BE49-F238E27FC236}">
+                <a16:creationId xmlns:a16="http://schemas.microsoft.com/office/drawing/2014/main" id="{A93A0F54-9DB8-4503-AC4D-560E2F1F25C1}"/>
+              </a:ext>
+            </a:extLst>
+          </p:cNvPr>
+          <p:cNvSpPr>
+            <a:spLocks noGrp="1"/>
+          </p:cNvSpPr>
+          <p:nvPr>
+            <p:ph idx="1"/>
+          </p:nvPr>
+        </p:nvSpPr>
+        <p:spPr>
+          <a:xfrm>
+            <a:off x="1821660" y="1056595"/>
+            <a:ext cx="10018713" cy="5351584"/>
+          </a:xfrm>
+        </p:spPr>
+        <p:txBody>
+          <a:bodyPr anchor="t" anchorCtr="0">
+            <a:noAutofit/>
+          </a:bodyPr>
+          <a:lstStyle/>
+          <a:p>
+            <a:r>
+              <a:rPr lang="en-US" dirty="0">
+                <a:latin typeface="Arial Rounded MT Bold" panose="020F0704030504030204" pitchFamily="34" charset="0"/>
+              </a:rPr>
+              <a:t>Union – Creates an array of unique values from two arrays</a:t>
+            </a:r>
+          </a:p>
+          <a:p>
+            <a:endParaRPr lang="en-US" dirty="0">
+              <a:latin typeface="Arial Rounded MT Bold" panose="020F0704030504030204" pitchFamily="34" charset="0"/>
+            </a:endParaRPr>
+          </a:p>
+          <a:p>
+            <a:r>
+              <a:rPr lang="en-US" dirty="0">
+                <a:latin typeface="Arial Rounded MT Bold" panose="020F0704030504030204" pitchFamily="34" charset="0"/>
+              </a:rPr>
+              <a:t>_.union([2], [1, </a:t>
+            </a:r>
+            <a:r>
+              <a:rPr lang="en-US" dirty="0">
+                <a:solidFill>
+                  <a:srgbClr val="FF0000"/>
+                </a:solidFill>
+                <a:latin typeface="Arial Rounded MT Bold" panose="020F0704030504030204" pitchFamily="34" charset="0"/>
+              </a:rPr>
+              <a:t>2</a:t>
+            </a:r>
+            <a:r>
+              <a:rPr lang="en-US" dirty="0">
+                <a:latin typeface="Arial Rounded MT Bold" panose="020F0704030504030204" pitchFamily="34" charset="0"/>
+              </a:rPr>
+              <a:t>]);</a:t>
+            </a:r>
+          </a:p>
+          <a:p>
+            <a:r>
+              <a:rPr lang="en-US" dirty="0">
+                <a:latin typeface="Arial Rounded MT Bold" panose="020F0704030504030204" pitchFamily="34" charset="0"/>
+              </a:rPr>
+              <a:t>// =&gt; [2, 1] </a:t>
+            </a:r>
+          </a:p>
+          <a:p>
+            <a:endParaRPr lang="en-US" dirty="0">
+              <a:latin typeface="Arial Rounded MT Bold" panose="020F0704030504030204" pitchFamily="34" charset="0"/>
+            </a:endParaRPr>
+          </a:p>
+          <a:p>
+            <a:endParaRPr lang="en-US" dirty="0">
+              <a:latin typeface="Arial Rounded MT Bold" panose="020F0704030504030204" pitchFamily="34" charset="0"/>
+            </a:endParaRPr>
+          </a:p>
+          <a:p>
+            <a:r>
+              <a:rPr lang="en-US" dirty="0">
+                <a:latin typeface="Arial Rounded MT Bold" panose="020F0704030504030204" pitchFamily="34" charset="0"/>
+              </a:rPr>
+              <a:t>Unique – removes any duplicates from an array.</a:t>
+            </a:r>
+          </a:p>
+          <a:p>
+            <a:r>
+              <a:rPr lang="en-US" dirty="0">
+                <a:latin typeface="Arial Rounded MT Bold" panose="020F0704030504030204" pitchFamily="34" charset="0"/>
+              </a:rPr>
+              <a:t>_.uniq([2, 1, 2]);</a:t>
+            </a:r>
+          </a:p>
+          <a:p>
+            <a:r>
+              <a:rPr lang="en-US" dirty="0">
+                <a:latin typeface="Arial Rounded MT Bold" panose="020F0704030504030204" pitchFamily="34" charset="0"/>
+              </a:rPr>
+              <a:t>// =&gt; [2, 1]</a:t>
+            </a:r>
+          </a:p>
+        </p:txBody>
+      </p:sp>
+    </p:spTree>
+    <p:extLst>
+      <p:ext uri="{BB962C8B-B14F-4D97-AF65-F5344CB8AC3E}">
+        <p14:creationId xmlns:p14="http://schemas.microsoft.com/office/powerpoint/2010/main" val="1900496310"/>
+      </p:ext>
+    </p:extLst>
+  </p:cSld>
+  <p:clrMapOvr>
+    <a:masterClrMapping/>
+  </p:clrMapOvr>
+</p:sld>
+</file>
+
+<file path=ppt/slides/slide18.xml><?xml version="1.0" encoding="utf-8"?>
+<p:sld xmlns:a="http://schemas.openxmlformats.org/drawingml/2006/main" xmlns:r="http://schemas.openxmlformats.org/officeDocument/2006/relationships" xmlns:p="http://schemas.openxmlformats.org/presentationml/2006/main">
+  <p:cSld>
+    <p:spTree>
+      <p:nvGrpSpPr>
+        <p:cNvPr id="1" name=""/>
+        <p:cNvGrpSpPr/>
+        <p:nvPr/>
+      </p:nvGrpSpPr>
+      <p:grpSpPr>
+        <a:xfrm>
+          <a:off x="0" y="0"/>
+          <a:ext cx="0" cy="0"/>
+          <a:chOff x="0" y="0"/>
+          <a:chExt cx="0" cy="0"/>
+        </a:xfrm>
+      </p:grpSpPr>
+      <p:sp>
+        <p:nvSpPr>
+          <p:cNvPr id="2" name="Title 1">
+            <a:extLst>
+              <a:ext uri="{FF2B5EF4-FFF2-40B4-BE49-F238E27FC236}">
+                <a16:creationId xmlns:a16="http://schemas.microsoft.com/office/drawing/2014/main" id="{5A427D0A-D6FB-477A-97A7-351BB69A5B48}"/>
+              </a:ext>
+            </a:extLst>
+          </p:cNvPr>
+          <p:cNvSpPr>
+            <a:spLocks noGrp="1"/>
+          </p:cNvSpPr>
+          <p:nvPr>
+            <p:ph type="title"/>
+          </p:nvPr>
+        </p:nvSpPr>
+        <p:spPr>
+          <a:xfrm>
+            <a:off x="1484310" y="255954"/>
+            <a:ext cx="10018713" cy="853831"/>
+          </a:xfrm>
+        </p:spPr>
+        <p:txBody>
+          <a:bodyPr/>
+          <a:lstStyle/>
+          <a:p>
+            <a:r>
+              <a:rPr lang="en-US" dirty="0">
+                <a:latin typeface="Arial Rounded MT Bold" panose="020F0704030504030204" pitchFamily="34" charset="0"/>
+              </a:rPr>
+              <a:t>Without and zip</a:t>
+            </a:r>
+            <a:endParaRPr lang="bg-BG" dirty="0"/>
+          </a:p>
+        </p:txBody>
+      </p:sp>
+      <p:sp>
+        <p:nvSpPr>
+          <p:cNvPr id="3" name="Content Placeholder 2">
+            <a:extLst>
+              <a:ext uri="{FF2B5EF4-FFF2-40B4-BE49-F238E27FC236}">
+                <a16:creationId xmlns:a16="http://schemas.microsoft.com/office/drawing/2014/main" id="{A93A0F54-9DB8-4503-AC4D-560E2F1F25C1}"/>
+              </a:ext>
+            </a:extLst>
+          </p:cNvPr>
+          <p:cNvSpPr>
+            <a:spLocks noGrp="1"/>
+          </p:cNvSpPr>
+          <p:nvPr>
+            <p:ph idx="1"/>
+          </p:nvPr>
+        </p:nvSpPr>
+        <p:spPr>
+          <a:xfrm>
+            <a:off x="1821660" y="1056595"/>
+            <a:ext cx="10018713" cy="5351584"/>
+          </a:xfrm>
+        </p:spPr>
+        <p:txBody>
+          <a:bodyPr anchor="t" anchorCtr="0">
+            <a:noAutofit/>
+          </a:bodyPr>
+          <a:lstStyle/>
+          <a:p>
+            <a:r>
+              <a:rPr lang="en-US" dirty="0">
+                <a:latin typeface="Arial Rounded MT Bold" panose="020F0704030504030204" pitchFamily="34" charset="0"/>
+              </a:rPr>
+              <a:t>Without – Creates an array, excluding all values given as arguments to the function</a:t>
+            </a:r>
+          </a:p>
+          <a:p>
+            <a:endParaRPr lang="en-US" dirty="0">
+              <a:latin typeface="Arial Rounded MT Bold" panose="020F0704030504030204" pitchFamily="34" charset="0"/>
+            </a:endParaRPr>
+          </a:p>
+          <a:p>
+            <a:r>
+              <a:rPr lang="en-US" dirty="0">
+                <a:latin typeface="Arial Rounded MT Bold" panose="020F0704030504030204" pitchFamily="34" charset="0"/>
+              </a:rPr>
+              <a:t>_.without([2, 1, 2, 3], </a:t>
+            </a:r>
+            <a:r>
+              <a:rPr lang="en-US" dirty="0">
+                <a:solidFill>
+                  <a:srgbClr val="00B050"/>
+                </a:solidFill>
+                <a:latin typeface="Arial Rounded MT Bold" panose="020F0704030504030204" pitchFamily="34" charset="0"/>
+              </a:rPr>
+              <a:t>1, 2</a:t>
+            </a:r>
+            <a:r>
+              <a:rPr lang="en-US" dirty="0">
+                <a:latin typeface="Arial Rounded MT Bold" panose="020F0704030504030204" pitchFamily="34" charset="0"/>
+              </a:rPr>
+              <a:t>);</a:t>
+            </a:r>
+          </a:p>
+          <a:p>
+            <a:r>
+              <a:rPr lang="en-US" dirty="0">
+                <a:latin typeface="Arial Rounded MT Bold" panose="020F0704030504030204" pitchFamily="34" charset="0"/>
+              </a:rPr>
+              <a:t>// =&gt; [3] -&gt; Returned all values except 1 &amp; 2</a:t>
+            </a:r>
+          </a:p>
+          <a:p>
+            <a:endParaRPr lang="en-US" dirty="0">
+              <a:latin typeface="Arial Rounded MT Bold" panose="020F0704030504030204" pitchFamily="34" charset="0"/>
+            </a:endParaRPr>
+          </a:p>
+          <a:p>
+            <a:r>
+              <a:rPr lang="en-US" dirty="0">
+                <a:latin typeface="Arial Rounded MT Bold" panose="020F0704030504030204" pitchFamily="34" charset="0"/>
+              </a:rPr>
+              <a:t>Zip – creates an array of grouped elements, which contains the first elements of given array, then the second and so on.</a:t>
+            </a:r>
+          </a:p>
+          <a:p>
+            <a:r>
+              <a:rPr lang="en-US" dirty="0">
+                <a:latin typeface="Arial Rounded MT Bold" panose="020F0704030504030204" pitchFamily="34" charset="0"/>
+              </a:rPr>
+              <a:t>_.zip(['a', 'b'], [1, 2], [true, false]);</a:t>
+            </a:r>
+          </a:p>
+          <a:p>
+            <a:r>
+              <a:rPr lang="en-US" dirty="0">
+                <a:latin typeface="Arial Rounded MT Bold" panose="020F0704030504030204" pitchFamily="34" charset="0"/>
+              </a:rPr>
+              <a:t>// =&gt; [['a', 1, true], ['b', 2, false]]</a:t>
+            </a:r>
+          </a:p>
+        </p:txBody>
+      </p:sp>
+    </p:spTree>
+    <p:extLst>
+      <p:ext uri="{BB962C8B-B14F-4D97-AF65-F5344CB8AC3E}">
+        <p14:creationId xmlns:p14="http://schemas.microsoft.com/office/powerpoint/2010/main" val="1773975746"/>
+      </p:ext>
+    </p:extLst>
+  </p:cSld>
+  <p:clrMapOvr>
+    <a:masterClrMapping/>
+  </p:clrMapOvr>
+</p:sld>
+</file>
+
+<file path=ppt/slides/slide19.xml><?xml version="1.0" encoding="utf-8"?>
+<p:sld xmlns:a="http://schemas.openxmlformats.org/drawingml/2006/main" xmlns:r="http://schemas.openxmlformats.org/officeDocument/2006/relationships" xmlns:p="http://schemas.openxmlformats.org/presentationml/2006/main">
+  <p:cSld>
+    <p:spTree>
+      <p:nvGrpSpPr>
+        <p:cNvPr id="1" name=""/>
+        <p:cNvGrpSpPr/>
+        <p:nvPr/>
+      </p:nvGrpSpPr>
+      <p:grpSpPr>
+        <a:xfrm>
+          <a:off x="0" y="0"/>
+          <a:ext cx="0" cy="0"/>
+          <a:chOff x="0" y="0"/>
+          <a:chExt cx="0" cy="0"/>
+        </a:xfrm>
+      </p:grpSpPr>
+      <p:sp>
+        <p:nvSpPr>
+          <p:cNvPr id="2" name="Title 1">
+            <a:extLst>
+              <a:ext uri="{FF2B5EF4-FFF2-40B4-BE49-F238E27FC236}">
+                <a16:creationId xmlns:a16="http://schemas.microsoft.com/office/drawing/2014/main" id="{E124CADE-3D29-4971-9916-A97378647EC8}"/>
+              </a:ext>
+            </a:extLst>
+          </p:cNvPr>
+          <p:cNvSpPr>
+            <a:spLocks noGrp="1"/>
+          </p:cNvSpPr>
+          <p:nvPr>
+            <p:ph type="title"/>
+          </p:nvPr>
+        </p:nvSpPr>
+        <p:spPr>
+          <a:xfrm>
+            <a:off x="2660748" y="834179"/>
+            <a:ext cx="7069178" cy="894425"/>
+          </a:xfrm>
+        </p:spPr>
+        <p:txBody>
+          <a:bodyPr/>
+          <a:lstStyle/>
+          <a:p>
+            <a:r>
+              <a:rPr lang="en-US" dirty="0"/>
+              <a:t>Questions?</a:t>
+            </a:r>
+            <a:endParaRPr lang="bg-BG" dirty="0"/>
+          </a:p>
+        </p:txBody>
+      </p:sp>
+      <p:pic>
+        <p:nvPicPr>
+          <p:cNvPr id="9218" name="Picture 2" descr="adhesive note papers with question mark and w questions hanging on the rope">
+            <a:extLst>
+              <a:ext uri="{FF2B5EF4-FFF2-40B4-BE49-F238E27FC236}">
+                <a16:creationId xmlns:a16="http://schemas.microsoft.com/office/drawing/2014/main" id="{859308B2-7E25-4494-8F22-A6B476C492D5}"/>
+              </a:ext>
+            </a:extLst>
+          </p:cNvPr>
+          <p:cNvPicPr>
+            <a:picLocks noGrp="1" noChangeAspect="1" noChangeArrowheads="1"/>
+          </p:cNvPicPr>
+          <p:nvPr>
+            <p:ph idx="1"/>
+          </p:nvPr>
+        </p:nvPicPr>
+        <p:blipFill>
+          <a:blip r:embed="rId2">
+            <a:extLst>
+              <a:ext uri="{28A0092B-C50C-407E-A947-70E740481C1C}">
+                <a14:useLocalDpi xmlns:a14="http://schemas.microsoft.com/office/drawing/2010/main" val="0"/>
+              </a:ext>
+            </a:extLst>
+          </a:blip>
+          <a:srcRect/>
+          <a:stretch>
+            <a:fillRect/>
+          </a:stretch>
+        </p:blipFill>
+        <p:spPr bwMode="auto">
+          <a:xfrm>
+            <a:off x="3308817" y="1728604"/>
+            <a:ext cx="5773039" cy="3971927"/>
+          </a:xfrm>
+          <a:prstGeom prst="rect">
+            <a:avLst/>
+          </a:prstGeom>
+          <a:noFill/>
+          <a:extLst>
+            <a:ext uri="{909E8E84-426E-40DD-AFC4-6F175D3DCCD1}">
+              <a14:hiddenFill xmlns:a14="http://schemas.microsoft.com/office/drawing/2010/main">
+                <a:solidFill>
+                  <a:srgbClr val="FFFFFF"/>
+                </a:solidFill>
+              </a14:hiddenFill>
+            </a:ext>
+          </a:extLst>
+        </p:spPr>
+      </p:pic>
+    </p:spTree>
+    <p:extLst>
+      <p:ext uri="{BB962C8B-B14F-4D97-AF65-F5344CB8AC3E}">
+        <p14:creationId xmlns:p14="http://schemas.microsoft.com/office/powerpoint/2010/main" val="1646483864"/>
       </p:ext>
     </p:extLst>
   </p:cSld>
@@ -6673,6 +8011,83 @@
     <p:extLst>
       <p:ext uri="{BB962C8B-B14F-4D97-AF65-F5344CB8AC3E}">
         <p14:creationId xmlns:p14="http://schemas.microsoft.com/office/powerpoint/2010/main" val="1223651048"/>
+      </p:ext>
+    </p:extLst>
+  </p:cSld>
+  <p:clrMapOvr>
+    <a:masterClrMapping/>
+  </p:clrMapOvr>
+</p:sld>
+</file>
+
+<file path=ppt/slides/slide20.xml><?xml version="1.0" encoding="utf-8"?>
+<p:sld xmlns:a="http://schemas.openxmlformats.org/drawingml/2006/main" xmlns:r="http://schemas.openxmlformats.org/officeDocument/2006/relationships" xmlns:p="http://schemas.openxmlformats.org/presentationml/2006/main">
+  <p:cSld>
+    <p:spTree>
+      <p:nvGrpSpPr>
+        <p:cNvPr id="1" name=""/>
+        <p:cNvGrpSpPr/>
+        <p:nvPr/>
+      </p:nvGrpSpPr>
+      <p:grpSpPr>
+        <a:xfrm>
+          <a:off x="0" y="0"/>
+          <a:ext cx="0" cy="0"/>
+          <a:chOff x="0" y="0"/>
+          <a:chExt cx="0" cy="0"/>
+        </a:xfrm>
+      </p:grpSpPr>
+      <p:pic>
+        <p:nvPicPr>
+          <p:cNvPr id="10244" name="Picture 4" descr="colorful thank you 2.jpg">
+            <a:extLst>
+              <a:ext uri="{FF2B5EF4-FFF2-40B4-BE49-F238E27FC236}">
+                <a16:creationId xmlns:a16="http://schemas.microsoft.com/office/drawing/2014/main" id="{A0899D36-DE3D-46BB-ACD9-041C67F736D3}"/>
+              </a:ext>
+            </a:extLst>
+          </p:cNvPr>
+          <p:cNvPicPr>
+            <a:picLocks noChangeAspect="1" noChangeArrowheads="1"/>
+          </p:cNvPicPr>
+          <p:nvPr/>
+        </p:nvPicPr>
+        <p:blipFill>
+          <a:blip r:embed="rId2">
+            <a:extLst>
+              <a:ext uri="{28A0092B-C50C-407E-A947-70E740481C1C}">
+                <a14:useLocalDpi xmlns:a14="http://schemas.microsoft.com/office/drawing/2010/main" val="0"/>
+              </a:ext>
+            </a:extLst>
+          </a:blip>
+          <a:srcRect/>
+          <a:stretch>
+            <a:fillRect/>
+          </a:stretch>
+        </p:blipFill>
+        <p:spPr bwMode="auto">
+          <a:xfrm>
+            <a:off x="2985763" y="508016"/>
+            <a:ext cx="7143750" cy="5362575"/>
+          </a:xfrm>
+          <a:prstGeom prst="rect">
+            <a:avLst/>
+          </a:prstGeom>
+          <a:noFill/>
+          <a:extLst>
+            <a:ext uri="{909E8E84-426E-40DD-AFC4-6F175D3DCCD1}">
+              <a14:hiddenFill xmlns:a14="http://schemas.microsoft.com/office/drawing/2010/main">
+                <a:solidFill>
+                  <a:srgbClr val="FFFFFF"/>
+                </a:solidFill>
+              </a14:hiddenFill>
+            </a:ext>
+          </a:extLst>
+        </p:spPr>
+      </p:pic>
+    </p:spTree>
+    <p:extLst>
+      <p:ext uri="{BB962C8B-B14F-4D97-AF65-F5344CB8AC3E}">
+        <p14:creationId xmlns:p14="http://schemas.microsoft.com/office/powerpoint/2010/main" val="4232353596"/>
       </p:ext>
     </p:extLst>
   </p:cSld>
@@ -7125,7 +8540,9 @@
           <a:lstStyle/>
           <a:p>
             <a:r>
-              <a:rPr lang="en-US" dirty="0"/>
+              <a:rPr lang="en-US" dirty="0">
+                <a:latin typeface="Arial Rounded MT Bold" panose="020F0704030504030204" pitchFamily="34" charset="0"/>
+              </a:rPr>
               <a:t>Concatenation of 2 Arrays</a:t>
             </a:r>
             <a:endParaRPr lang="bg-BG" dirty="0"/>
@@ -7335,7 +8752,9 @@
           <a:lstStyle/>
           <a:p>
             <a:r>
-              <a:rPr lang="en-US" dirty="0"/>
+              <a:rPr lang="en-US" dirty="0">
+                <a:latin typeface="Arial Rounded MT Bold" panose="020F0704030504030204" pitchFamily="34" charset="0"/>
+              </a:rPr>
               <a:t>Difference between 2 arrays</a:t>
             </a:r>
             <a:endParaRPr lang="bg-BG" dirty="0"/>
@@ -7511,16 +8930,16 @@
           <a:p>
             <a:pPr lvl="1"/>
             <a:r>
-              <a:rPr lang="en-US" altLang="bg-BG" sz="1200" dirty="0">
-                <a:latin typeface="Arial Rounded MT Bold" panose="020F0704030504030204" pitchFamily="34" charset="0"/>
-              </a:rPr>
-              <a:t>var array = [1, 2, 3];</a:t>
+              <a:rPr lang="en-US" altLang="bg-BG" sz="1400" dirty="0">
+                <a:latin typeface="Arial Rounded MT Bold" panose="020F0704030504030204" pitchFamily="34" charset="0"/>
+              </a:rPr>
+              <a:t>const array = [1, 2, 3];</a:t>
             </a:r>
           </a:p>
           <a:p>
             <a:pPr lvl="1"/>
             <a:r>
-              <a:rPr lang="en-US" altLang="bg-BG" sz="1200" dirty="0">
+              <a:rPr lang="en-US" altLang="bg-BG" sz="1400" dirty="0">
                 <a:latin typeface="Arial Rounded MT Bold" panose="020F0704030504030204" pitchFamily="34" charset="0"/>
               </a:rPr>
               <a:t>_.fill(array, 'a');</a:t>
@@ -7529,7 +8948,7 @@
           <a:p>
             <a:pPr lvl="1"/>
             <a:r>
-              <a:rPr lang="en-US" altLang="bg-BG" sz="1200" dirty="0">
+              <a:rPr lang="en-US" altLang="bg-BG" sz="1400" dirty="0">
                 <a:latin typeface="Arial Rounded MT Bold" panose="020F0704030504030204" pitchFamily="34" charset="0"/>
               </a:rPr>
               <a:t>// =&gt; ['a', 'a', 'a']</a:t>
@@ -7538,7 +8957,7 @@
           <a:p>
             <a:pPr lvl="1"/>
             <a:r>
-              <a:rPr lang="en-US" altLang="bg-BG" sz="1200" dirty="0">
+              <a:rPr lang="en-US" altLang="bg-BG" sz="1400" dirty="0">
                 <a:latin typeface="Arial Rounded MT Bold" panose="020F0704030504030204" pitchFamily="34" charset="0"/>
               </a:rPr>
               <a:t>_.fill(Array(3), 2);</a:t>
@@ -7547,12 +8966,12 @@
           <a:p>
             <a:pPr lvl="1"/>
             <a:r>
-              <a:rPr lang="en-US" altLang="bg-BG" sz="1200" dirty="0">
+              <a:rPr lang="en-US" altLang="bg-BG" sz="1400" dirty="0">
                 <a:latin typeface="Arial Rounded MT Bold" panose="020F0704030504030204" pitchFamily="34" charset="0"/>
               </a:rPr>
               <a:t>// =&gt; [2, 2, 2]</a:t>
             </a:r>
-            <a:endParaRPr lang="bg-BG" altLang="bg-BG" sz="1200" dirty="0">
+            <a:endParaRPr lang="bg-BG" altLang="bg-BG" sz="1400" dirty="0">
               <a:latin typeface="Arial" panose="020B0604020202020204" pitchFamily="34" charset="0"/>
             </a:endParaRPr>
           </a:p>
@@ -7628,7 +9047,9 @@
           <a:lstStyle/>
           <a:p>
             <a:r>
-              <a:rPr lang="en-US" dirty="0"/>
+              <a:rPr lang="en-US" dirty="0">
+                <a:latin typeface="Arial Rounded MT Bold" panose="020F0704030504030204" pitchFamily="34" charset="0"/>
+              </a:rPr>
               <a:t>Find First Index</a:t>
             </a:r>
             <a:endParaRPr lang="bg-BG" dirty="0"/>
@@ -7801,7 +9222,9 @@
           <a:lstStyle/>
           <a:p>
             <a:r>
-              <a:rPr lang="en-US" dirty="0"/>
+              <a:rPr lang="en-US" dirty="0">
+                <a:latin typeface="Arial Rounded MT Bold" panose="020F0704030504030204" pitchFamily="34" charset="0"/>
+              </a:rPr>
               <a:t>Find Last Index</a:t>
             </a:r>
             <a:endParaRPr lang="bg-BG" dirty="0"/>

</xml_diff>

<commit_message>
Update presentation and make api calls file
</commit_message>
<xml_diff>
--- a/Lodash.pptx
+++ b/Lodash.pptx
@@ -633,7 +633,7 @@
           <a:p>
             <a:fld id="{74156785-9F24-4C3E-87A9-F22B8CFCC45B}" type="datetimeFigureOut">
               <a:rPr lang="bg-BG" smtClean="0"/>
-              <a:t>18.4.2019 г.</a:t>
+              <a:t>18.5.2019 г.</a:t>
             </a:fld>
             <a:endParaRPr lang="bg-BG"/>
           </a:p>
@@ -928,7 +928,7 @@
           <a:p>
             <a:fld id="{74156785-9F24-4C3E-87A9-F22B8CFCC45B}" type="datetimeFigureOut">
               <a:rPr lang="bg-BG" smtClean="0"/>
-              <a:t>18.4.2019 г.</a:t>
+              <a:t>18.5.2019 г.</a:t>
             </a:fld>
             <a:endParaRPr lang="bg-BG"/>
           </a:p>
@@ -1176,7 +1176,7 @@
           <a:p>
             <a:fld id="{74156785-9F24-4C3E-87A9-F22B8CFCC45B}" type="datetimeFigureOut">
               <a:rPr lang="bg-BG" smtClean="0"/>
-              <a:t>18.4.2019 г.</a:t>
+              <a:t>18.5.2019 г.</a:t>
             </a:fld>
             <a:endParaRPr lang="bg-BG"/>
           </a:p>
@@ -1716,7 +1716,7 @@
           <a:p>
             <a:fld id="{74156785-9F24-4C3E-87A9-F22B8CFCC45B}" type="datetimeFigureOut">
               <a:rPr lang="bg-BG" smtClean="0"/>
-              <a:t>18.4.2019 г.</a:t>
+              <a:t>18.5.2019 г.</a:t>
             </a:fld>
             <a:endParaRPr lang="bg-BG"/>
           </a:p>
@@ -1964,7 +1964,7 @@
           <a:p>
             <a:fld id="{74156785-9F24-4C3E-87A9-F22B8CFCC45B}" type="datetimeFigureOut">
               <a:rPr lang="bg-BG" smtClean="0"/>
-              <a:t>18.4.2019 г.</a:t>
+              <a:t>18.5.2019 г.</a:t>
             </a:fld>
             <a:endParaRPr lang="bg-BG"/>
           </a:p>
@@ -2496,7 +2496,7 @@
           <a:p>
             <a:fld id="{74156785-9F24-4C3E-87A9-F22B8CFCC45B}" type="datetimeFigureOut">
               <a:rPr lang="bg-BG" smtClean="0"/>
-              <a:t>18.4.2019 г.</a:t>
+              <a:t>18.5.2019 г.</a:t>
             </a:fld>
             <a:endParaRPr lang="bg-BG"/>
           </a:p>
@@ -2793,7 +2793,7 @@
           <a:p>
             <a:fld id="{74156785-9F24-4C3E-87A9-F22B8CFCC45B}" type="datetimeFigureOut">
               <a:rPr lang="bg-BG" smtClean="0"/>
-              <a:t>18.4.2019 г.</a:t>
+              <a:t>18.5.2019 г.</a:t>
             </a:fld>
             <a:endParaRPr lang="bg-BG"/>
           </a:p>
@@ -2967,7 +2967,7 @@
           <a:p>
             <a:fld id="{74156785-9F24-4C3E-87A9-F22B8CFCC45B}" type="datetimeFigureOut">
               <a:rPr lang="bg-BG" smtClean="0"/>
-              <a:t>18.4.2019 г.</a:t>
+              <a:t>18.5.2019 г.</a:t>
             </a:fld>
             <a:endParaRPr lang="bg-BG"/>
           </a:p>
@@ -3147,7 +3147,7 @@
           <a:p>
             <a:fld id="{74156785-9F24-4C3E-87A9-F22B8CFCC45B}" type="datetimeFigureOut">
               <a:rPr lang="bg-BG" smtClean="0"/>
-              <a:t>18.4.2019 г.</a:t>
+              <a:t>18.5.2019 г.</a:t>
             </a:fld>
             <a:endParaRPr lang="bg-BG"/>
           </a:p>
@@ -3317,7 +3317,7 @@
           <a:p>
             <a:fld id="{74156785-9F24-4C3E-87A9-F22B8CFCC45B}" type="datetimeFigureOut">
               <a:rPr lang="bg-BG" smtClean="0"/>
-              <a:t>18.4.2019 г.</a:t>
+              <a:t>18.5.2019 г.</a:t>
             </a:fld>
             <a:endParaRPr lang="bg-BG"/>
           </a:p>
@@ -3568,7 +3568,7 @@
           <a:p>
             <a:fld id="{74156785-9F24-4C3E-87A9-F22B8CFCC45B}" type="datetimeFigureOut">
               <a:rPr lang="bg-BG" smtClean="0"/>
-              <a:t>18.4.2019 г.</a:t>
+              <a:t>18.5.2019 г.</a:t>
             </a:fld>
             <a:endParaRPr lang="bg-BG"/>
           </a:p>
@@ -3865,7 +3865,7 @@
           <a:p>
             <a:fld id="{74156785-9F24-4C3E-87A9-F22B8CFCC45B}" type="datetimeFigureOut">
               <a:rPr lang="bg-BG" smtClean="0"/>
-              <a:t>18.4.2019 г.</a:t>
+              <a:t>18.5.2019 г.</a:t>
             </a:fld>
             <a:endParaRPr lang="bg-BG"/>
           </a:p>
@@ -4307,7 +4307,7 @@
           <a:p>
             <a:fld id="{74156785-9F24-4C3E-87A9-F22B8CFCC45B}" type="datetimeFigureOut">
               <a:rPr lang="bg-BG" smtClean="0"/>
-              <a:t>18.4.2019 г.</a:t>
+              <a:t>18.5.2019 г.</a:t>
             </a:fld>
             <a:endParaRPr lang="bg-BG"/>
           </a:p>
@@ -4425,7 +4425,7 @@
           <a:p>
             <a:fld id="{74156785-9F24-4C3E-87A9-F22B8CFCC45B}" type="datetimeFigureOut">
               <a:rPr lang="bg-BG" smtClean="0"/>
-              <a:t>18.4.2019 г.</a:t>
+              <a:t>18.5.2019 г.</a:t>
             </a:fld>
             <a:endParaRPr lang="bg-BG"/>
           </a:p>
@@ -4520,7 +4520,7 @@
           <a:p>
             <a:fld id="{74156785-9F24-4C3E-87A9-F22B8CFCC45B}" type="datetimeFigureOut">
               <a:rPr lang="bg-BG" smtClean="0"/>
-              <a:t>18.4.2019 г.</a:t>
+              <a:t>18.5.2019 г.</a:t>
             </a:fld>
             <a:endParaRPr lang="bg-BG"/>
           </a:p>
@@ -4803,7 +4803,7 @@
           <a:p>
             <a:fld id="{74156785-9F24-4C3E-87A9-F22B8CFCC45B}" type="datetimeFigureOut">
               <a:rPr lang="bg-BG" smtClean="0"/>
-              <a:t>18.4.2019 г.</a:t>
+              <a:t>18.5.2019 г.</a:t>
             </a:fld>
             <a:endParaRPr lang="bg-BG"/>
           </a:p>
@@ -5093,7 +5093,7 @@
           <a:p>
             <a:fld id="{74156785-9F24-4C3E-87A9-F22B8CFCC45B}" type="datetimeFigureOut">
               <a:rPr lang="bg-BG" smtClean="0"/>
-              <a:t>18.4.2019 г.</a:t>
+              <a:t>18.5.2019 г.</a:t>
             </a:fld>
             <a:endParaRPr lang="bg-BG"/>
           </a:p>
@@ -5623,7 +5623,7 @@
           <a:p>
             <a:fld id="{74156785-9F24-4C3E-87A9-F22B8CFCC45B}" type="datetimeFigureOut">
               <a:rPr lang="bg-BG" smtClean="0"/>
-              <a:t>18.4.2019 г.</a:t>
+              <a:t>18.5.2019 г.</a:t>
             </a:fld>
             <a:endParaRPr lang="bg-BG"/>
           </a:p>
@@ -8472,10 +8472,16 @@
           </a:p>
           <a:p>
             <a:r>
-              <a:rPr lang="en-US" dirty="0">
-                <a:latin typeface="Arial Rounded MT Bold" panose="020F0704030504030204" pitchFamily="34" charset="0"/>
-              </a:rPr>
-              <a:t>Concatenate 2 arrays:</a:t>
+              <a:rPr lang="en-US">
+                <a:latin typeface="Arial Rounded MT Bold" panose="020F0704030504030204" pitchFamily="34" charset="0"/>
+              </a:rPr>
+              <a:t>Concatenation of </a:t>
+            </a:r>
+            <a:r>
+              <a:rPr lang="en-US" dirty="0">
+                <a:latin typeface="Arial Rounded MT Bold" panose="020F0704030504030204" pitchFamily="34" charset="0"/>
+              </a:rPr>
+              <a:t>2 arrays:</a:t>
             </a:r>
           </a:p>
           <a:p>

</xml_diff>

<commit_message>
Updates to the api
</commit_message>
<xml_diff>
--- a/Lodash.pptx
+++ b/Lodash.pptx
@@ -633,7 +633,7 @@
           <a:p>
             <a:fld id="{74156785-9F24-4C3E-87A9-F22B8CFCC45B}" type="datetimeFigureOut">
               <a:rPr lang="bg-BG" smtClean="0"/>
-              <a:t>18.5.2019 г.</a:t>
+              <a:t>21.5.2019 г.</a:t>
             </a:fld>
             <a:endParaRPr lang="bg-BG"/>
           </a:p>
@@ -928,7 +928,7 @@
           <a:p>
             <a:fld id="{74156785-9F24-4C3E-87A9-F22B8CFCC45B}" type="datetimeFigureOut">
               <a:rPr lang="bg-BG" smtClean="0"/>
-              <a:t>18.5.2019 г.</a:t>
+              <a:t>21.5.2019 г.</a:t>
             </a:fld>
             <a:endParaRPr lang="bg-BG"/>
           </a:p>
@@ -1176,7 +1176,7 @@
           <a:p>
             <a:fld id="{74156785-9F24-4C3E-87A9-F22B8CFCC45B}" type="datetimeFigureOut">
               <a:rPr lang="bg-BG" smtClean="0"/>
-              <a:t>18.5.2019 г.</a:t>
+              <a:t>21.5.2019 г.</a:t>
             </a:fld>
             <a:endParaRPr lang="bg-BG"/>
           </a:p>
@@ -1716,7 +1716,7 @@
           <a:p>
             <a:fld id="{74156785-9F24-4C3E-87A9-F22B8CFCC45B}" type="datetimeFigureOut">
               <a:rPr lang="bg-BG" smtClean="0"/>
-              <a:t>18.5.2019 г.</a:t>
+              <a:t>21.5.2019 г.</a:t>
             </a:fld>
             <a:endParaRPr lang="bg-BG"/>
           </a:p>
@@ -1964,7 +1964,7 @@
           <a:p>
             <a:fld id="{74156785-9F24-4C3E-87A9-F22B8CFCC45B}" type="datetimeFigureOut">
               <a:rPr lang="bg-BG" smtClean="0"/>
-              <a:t>18.5.2019 г.</a:t>
+              <a:t>21.5.2019 г.</a:t>
             </a:fld>
             <a:endParaRPr lang="bg-BG"/>
           </a:p>
@@ -2496,7 +2496,7 @@
           <a:p>
             <a:fld id="{74156785-9F24-4C3E-87A9-F22B8CFCC45B}" type="datetimeFigureOut">
               <a:rPr lang="bg-BG" smtClean="0"/>
-              <a:t>18.5.2019 г.</a:t>
+              <a:t>21.5.2019 г.</a:t>
             </a:fld>
             <a:endParaRPr lang="bg-BG"/>
           </a:p>
@@ -2793,7 +2793,7 @@
           <a:p>
             <a:fld id="{74156785-9F24-4C3E-87A9-F22B8CFCC45B}" type="datetimeFigureOut">
               <a:rPr lang="bg-BG" smtClean="0"/>
-              <a:t>18.5.2019 г.</a:t>
+              <a:t>21.5.2019 г.</a:t>
             </a:fld>
             <a:endParaRPr lang="bg-BG"/>
           </a:p>
@@ -2967,7 +2967,7 @@
           <a:p>
             <a:fld id="{74156785-9F24-4C3E-87A9-F22B8CFCC45B}" type="datetimeFigureOut">
               <a:rPr lang="bg-BG" smtClean="0"/>
-              <a:t>18.5.2019 г.</a:t>
+              <a:t>21.5.2019 г.</a:t>
             </a:fld>
             <a:endParaRPr lang="bg-BG"/>
           </a:p>
@@ -3147,7 +3147,7 @@
           <a:p>
             <a:fld id="{74156785-9F24-4C3E-87A9-F22B8CFCC45B}" type="datetimeFigureOut">
               <a:rPr lang="bg-BG" smtClean="0"/>
-              <a:t>18.5.2019 г.</a:t>
+              <a:t>21.5.2019 г.</a:t>
             </a:fld>
             <a:endParaRPr lang="bg-BG"/>
           </a:p>
@@ -3317,7 +3317,7 @@
           <a:p>
             <a:fld id="{74156785-9F24-4C3E-87A9-F22B8CFCC45B}" type="datetimeFigureOut">
               <a:rPr lang="bg-BG" smtClean="0"/>
-              <a:t>18.5.2019 г.</a:t>
+              <a:t>21.5.2019 г.</a:t>
             </a:fld>
             <a:endParaRPr lang="bg-BG"/>
           </a:p>
@@ -3568,7 +3568,7 @@
           <a:p>
             <a:fld id="{74156785-9F24-4C3E-87A9-F22B8CFCC45B}" type="datetimeFigureOut">
               <a:rPr lang="bg-BG" smtClean="0"/>
-              <a:t>18.5.2019 г.</a:t>
+              <a:t>21.5.2019 г.</a:t>
             </a:fld>
             <a:endParaRPr lang="bg-BG"/>
           </a:p>
@@ -3865,7 +3865,7 @@
           <a:p>
             <a:fld id="{74156785-9F24-4C3E-87A9-F22B8CFCC45B}" type="datetimeFigureOut">
               <a:rPr lang="bg-BG" smtClean="0"/>
-              <a:t>18.5.2019 г.</a:t>
+              <a:t>21.5.2019 г.</a:t>
             </a:fld>
             <a:endParaRPr lang="bg-BG"/>
           </a:p>
@@ -4307,7 +4307,7 @@
           <a:p>
             <a:fld id="{74156785-9F24-4C3E-87A9-F22B8CFCC45B}" type="datetimeFigureOut">
               <a:rPr lang="bg-BG" smtClean="0"/>
-              <a:t>18.5.2019 г.</a:t>
+              <a:t>21.5.2019 г.</a:t>
             </a:fld>
             <a:endParaRPr lang="bg-BG"/>
           </a:p>
@@ -4425,7 +4425,7 @@
           <a:p>
             <a:fld id="{74156785-9F24-4C3E-87A9-F22B8CFCC45B}" type="datetimeFigureOut">
               <a:rPr lang="bg-BG" smtClean="0"/>
-              <a:t>18.5.2019 г.</a:t>
+              <a:t>21.5.2019 г.</a:t>
             </a:fld>
             <a:endParaRPr lang="bg-BG"/>
           </a:p>
@@ -4520,7 +4520,7 @@
           <a:p>
             <a:fld id="{74156785-9F24-4C3E-87A9-F22B8CFCC45B}" type="datetimeFigureOut">
               <a:rPr lang="bg-BG" smtClean="0"/>
-              <a:t>18.5.2019 г.</a:t>
+              <a:t>21.5.2019 г.</a:t>
             </a:fld>
             <a:endParaRPr lang="bg-BG"/>
           </a:p>
@@ -4803,7 +4803,7 @@
           <a:p>
             <a:fld id="{74156785-9F24-4C3E-87A9-F22B8CFCC45B}" type="datetimeFigureOut">
               <a:rPr lang="bg-BG" smtClean="0"/>
-              <a:t>18.5.2019 г.</a:t>
+              <a:t>21.5.2019 г.</a:t>
             </a:fld>
             <a:endParaRPr lang="bg-BG"/>
           </a:p>
@@ -5093,7 +5093,7 @@
           <a:p>
             <a:fld id="{74156785-9F24-4C3E-87A9-F22B8CFCC45B}" type="datetimeFigureOut">
               <a:rPr lang="bg-BG" smtClean="0"/>
-              <a:t>18.5.2019 г.</a:t>
+              <a:t>21.5.2019 г.</a:t>
             </a:fld>
             <a:endParaRPr lang="bg-BG"/>
           </a:p>
@@ -5623,7 +5623,7 @@
           <a:p>
             <a:fld id="{74156785-9F24-4C3E-87A9-F22B8CFCC45B}" type="datetimeFigureOut">
               <a:rPr lang="bg-BG" smtClean="0"/>
-              <a:t>18.5.2019 г.</a:t>
+              <a:t>21.5.2019 г.</a:t>
             </a:fld>
             <a:endParaRPr lang="bg-BG"/>
           </a:p>
@@ -7527,7 +7527,19 @@
               <a:rPr lang="en-US" dirty="0">
                 <a:latin typeface="Arial Rounded MT Bold" panose="020F0704030504030204" pitchFamily="34" charset="0"/>
               </a:rPr>
-              <a:t>Union – Creates an array of unique values from two arrays</a:t>
+              <a:t>Union – Creates an array </a:t>
+            </a:r>
+            <a:r>
+              <a:rPr lang="en-US">
+                <a:latin typeface="Arial Rounded MT Bold" panose="020F0704030504030204" pitchFamily="34" charset="0"/>
+              </a:rPr>
+              <a:t>of common values </a:t>
+            </a:r>
+            <a:r>
+              <a:rPr lang="en-US" dirty="0">
+                <a:latin typeface="Arial Rounded MT Bold" panose="020F0704030504030204" pitchFamily="34" charset="0"/>
+              </a:rPr>
+              <a:t>from two arrays</a:t>
             </a:r>
           </a:p>
           <a:p>
@@ -8201,7 +8213,7 @@
               <a:rPr lang="en-US" dirty="0">
                 <a:latin typeface="Arial Rounded MT Bold" panose="020F0704030504030204" pitchFamily="34" charset="0"/>
               </a:rPr>
-              <a:t>And then you can import it in any .ts File.</a:t>
+              <a:t>Afterwards you can import lodash in any .ts File.</a:t>
             </a:r>
           </a:p>
           <a:p>

</xml_diff>